<commit_message>
Ajout de la partie DAG et des slides de présentation
</commit_message>
<xml_diff>
--- a/__others__/présentation.pptx
+++ b/__others__/présentation.pptx
@@ -5,7 +5,7 @@
     <p:sldMasterId id="2147483684" r:id="rId1"/>
   </p:sldMasterIdLst>
   <p:notesMasterIdLst>
-    <p:notesMasterId r:id="rId12"/>
+    <p:notesMasterId r:id="rId13"/>
   </p:notesMasterIdLst>
   <p:sldIdLst>
     <p:sldId id="256" r:id="rId2"/>
@@ -15,9 +15,10 @@
     <p:sldId id="264" r:id="rId6"/>
     <p:sldId id="269" r:id="rId7"/>
     <p:sldId id="268" r:id="rId8"/>
-    <p:sldId id="270" r:id="rId9"/>
-    <p:sldId id="265" r:id="rId10"/>
-    <p:sldId id="266" r:id="rId11"/>
+    <p:sldId id="271" r:id="rId9"/>
+    <p:sldId id="270" r:id="rId10"/>
+    <p:sldId id="265" r:id="rId11"/>
+    <p:sldId id="266" r:id="rId12"/>
   </p:sldIdLst>
   <p:sldSz cx="12192000" cy="6858000"/>
   <p:notesSz cx="6858000" cy="9144000"/>
@@ -5059,6 +5060,600 @@
       </p:grpSpPr>
       <p:sp>
         <p:nvSpPr>
+          <p:cNvPr id="36" name="Titre vertical 35">
+            <a:extLst>
+              <a:ext uri="{FF2B5EF4-FFF2-40B4-BE49-F238E27FC236}">
+                <a16:creationId xmlns:a16="http://schemas.microsoft.com/office/drawing/2014/main" id="{DB9C129C-5D42-4387-8166-9397FB3D0439}"/>
+              </a:ext>
+            </a:extLst>
+          </p:cNvPr>
+          <p:cNvSpPr>
+            <a:spLocks noGrp="1"/>
+          </p:cNvSpPr>
+          <p:nvPr>
+            <p:ph type="title" orient="vert"/>
+          </p:nvPr>
+        </p:nvSpPr>
+        <p:spPr>
+          <a:xfrm>
+            <a:off x="10041774" y="412302"/>
+            <a:ext cx="1312026" cy="5759898"/>
+          </a:xfrm>
+        </p:spPr>
+        <p:txBody>
+          <a:bodyPr/>
+          <a:lstStyle/>
+          <a:p>
+            <a:r>
+              <a:rPr lang="fr-FR" dirty="0"/>
+              <a:t>ANNEXE 1</a:t>
+            </a:r>
+          </a:p>
+        </p:txBody>
+      </p:sp>
+      <p:sp>
+        <p:nvSpPr>
+          <p:cNvPr id="2" name="Espace réservé de la date 1">
+            <a:extLst>
+              <a:ext uri="{FF2B5EF4-FFF2-40B4-BE49-F238E27FC236}">
+                <a16:creationId xmlns:a16="http://schemas.microsoft.com/office/drawing/2014/main" id="{195D6EBD-3BEC-E192-1844-56E8405F4740}"/>
+              </a:ext>
+            </a:extLst>
+          </p:cNvPr>
+          <p:cNvSpPr>
+            <a:spLocks noGrp="1"/>
+          </p:cNvSpPr>
+          <p:nvPr>
+            <p:ph type="dt" sz="half" idx="10"/>
+          </p:nvPr>
+        </p:nvSpPr>
+        <p:spPr/>
+        <p:txBody>
+          <a:bodyPr/>
+          <a:lstStyle/>
+          <a:p>
+            <a:r>
+              <a:rPr lang="fr-FR"/>
+              <a:t>12/05/2025</a:t>
+            </a:r>
+          </a:p>
+        </p:txBody>
+      </p:sp>
+      <p:sp>
+        <p:nvSpPr>
+          <p:cNvPr id="3" name="Espace réservé du pied de page 2">
+            <a:extLst>
+              <a:ext uri="{FF2B5EF4-FFF2-40B4-BE49-F238E27FC236}">
+                <a16:creationId xmlns:a16="http://schemas.microsoft.com/office/drawing/2014/main" id="{72BC6ADB-4F82-16FB-4DF1-A11B690D46E7}"/>
+              </a:ext>
+            </a:extLst>
+          </p:cNvPr>
+          <p:cNvSpPr>
+            <a:spLocks noGrp="1"/>
+          </p:cNvSpPr>
+          <p:nvPr>
+            <p:ph type="ftr" sz="quarter" idx="11"/>
+          </p:nvPr>
+        </p:nvSpPr>
+        <p:spPr/>
+        <p:txBody>
+          <a:bodyPr/>
+          <a:lstStyle/>
+          <a:p>
+            <a:r>
+              <a:rPr lang="fr-FR"/>
+              <a:t>Marilyne HU</a:t>
+            </a:r>
+            <a:endParaRPr lang="fr-FR" dirty="0"/>
+          </a:p>
+        </p:txBody>
+      </p:sp>
+      <p:sp>
+        <p:nvSpPr>
+          <p:cNvPr id="4" name="Espace réservé du numéro de diapositive 3">
+            <a:extLst>
+              <a:ext uri="{FF2B5EF4-FFF2-40B4-BE49-F238E27FC236}">
+                <a16:creationId xmlns:a16="http://schemas.microsoft.com/office/drawing/2014/main" id="{854B1843-A954-F208-B5D1-A45B930AB947}"/>
+              </a:ext>
+            </a:extLst>
+          </p:cNvPr>
+          <p:cNvSpPr>
+            <a:spLocks noGrp="1"/>
+          </p:cNvSpPr>
+          <p:nvPr>
+            <p:ph type="sldNum" sz="quarter" idx="12"/>
+          </p:nvPr>
+        </p:nvSpPr>
+        <p:spPr/>
+        <p:txBody>
+          <a:bodyPr/>
+          <a:lstStyle/>
+          <a:p>
+            <a:fld id="{B1028D0C-BA6E-42FF-99E3-BB7D9AEC48EF}" type="slidenum">
+              <a:rPr lang="fr-FR" smtClean="0"/>
+              <a:t>10</a:t>
+            </a:fld>
+            <a:endParaRPr lang="fr-FR"/>
+          </a:p>
+        </p:txBody>
+      </p:sp>
+      <p:sp>
+        <p:nvSpPr>
+          <p:cNvPr id="5" name="Ellipse 4">
+            <a:extLst>
+              <a:ext uri="{FF2B5EF4-FFF2-40B4-BE49-F238E27FC236}">
+                <a16:creationId xmlns:a16="http://schemas.microsoft.com/office/drawing/2014/main" id="{D757DBB9-F421-FA42-C1E2-F75E92BF5060}"/>
+              </a:ext>
+            </a:extLst>
+          </p:cNvPr>
+          <p:cNvSpPr/>
+          <p:nvPr/>
+        </p:nvSpPr>
+        <p:spPr>
+          <a:xfrm>
+            <a:off x="4857750" y="2686051"/>
+            <a:ext cx="1924050" cy="844550"/>
+          </a:xfrm>
+          <a:prstGeom prst="ellipse">
+            <a:avLst/>
+          </a:prstGeom>
+          <a:solidFill>
+            <a:schemeClr val="accent6"/>
+          </a:solidFill>
+          <a:ln>
+            <a:noFill/>
+          </a:ln>
+        </p:spPr>
+        <p:style>
+          <a:lnRef idx="0">
+            <a:scrgbClr r="0" g="0" b="0"/>
+          </a:lnRef>
+          <a:fillRef idx="0">
+            <a:scrgbClr r="0" g="0" b="0"/>
+          </a:fillRef>
+          <a:effectRef idx="0">
+            <a:scrgbClr r="0" g="0" b="0"/>
+          </a:effectRef>
+          <a:fontRef idx="minor">
+            <a:schemeClr val="lt1"/>
+          </a:fontRef>
+        </p:style>
+        <p:txBody>
+          <a:bodyPr rtlCol="0" anchor="ctr"/>
+          <a:lstStyle/>
+          <a:p>
+            <a:pPr algn="ctr"/>
+            <a:r>
+              <a:rPr lang="fr-FR" dirty="0"/>
+              <a:t>DRUG</a:t>
+            </a:r>
+          </a:p>
+        </p:txBody>
+      </p:sp>
+      <p:sp>
+        <p:nvSpPr>
+          <p:cNvPr id="6" name="Ellipse 5">
+            <a:extLst>
+              <a:ext uri="{FF2B5EF4-FFF2-40B4-BE49-F238E27FC236}">
+                <a16:creationId xmlns:a16="http://schemas.microsoft.com/office/drawing/2014/main" id="{817DE848-2EEC-578B-CCC2-379836B438A9}"/>
+              </a:ext>
+            </a:extLst>
+          </p:cNvPr>
+          <p:cNvSpPr/>
+          <p:nvPr/>
+        </p:nvSpPr>
+        <p:spPr>
+          <a:xfrm>
+            <a:off x="6997700" y="1066800"/>
+            <a:ext cx="2000250" cy="895350"/>
+          </a:xfrm>
+          <a:prstGeom prst="ellipse">
+            <a:avLst/>
+          </a:prstGeom>
+          <a:solidFill>
+            <a:schemeClr val="accent6"/>
+          </a:solidFill>
+          <a:ln>
+            <a:noFill/>
+          </a:ln>
+        </p:spPr>
+        <p:style>
+          <a:lnRef idx="0">
+            <a:scrgbClr r="0" g="0" b="0"/>
+          </a:lnRef>
+          <a:fillRef idx="0">
+            <a:scrgbClr r="0" g="0" b="0"/>
+          </a:fillRef>
+          <a:effectRef idx="0">
+            <a:scrgbClr r="0" g="0" b="0"/>
+          </a:effectRef>
+          <a:fontRef idx="minor">
+            <a:schemeClr val="lt1"/>
+          </a:fontRef>
+        </p:style>
+        <p:txBody>
+          <a:bodyPr rtlCol="0" anchor="ctr"/>
+          <a:lstStyle/>
+          <a:p>
+            <a:pPr algn="ctr"/>
+            <a:r>
+              <a:rPr lang="fr-FR" dirty="0"/>
+              <a:t>CLINICAL TRIALS</a:t>
+            </a:r>
+          </a:p>
+        </p:txBody>
+      </p:sp>
+      <p:sp>
+        <p:nvSpPr>
+          <p:cNvPr id="7" name="Ellipse 6">
+            <a:extLst>
+              <a:ext uri="{FF2B5EF4-FFF2-40B4-BE49-F238E27FC236}">
+                <a16:creationId xmlns:a16="http://schemas.microsoft.com/office/drawing/2014/main" id="{F92502DB-7FF4-27F4-E38A-374B36CEFCE5}"/>
+              </a:ext>
+            </a:extLst>
+          </p:cNvPr>
+          <p:cNvSpPr/>
+          <p:nvPr/>
+        </p:nvSpPr>
+        <p:spPr>
+          <a:xfrm>
+            <a:off x="4819650" y="4920312"/>
+            <a:ext cx="2000250" cy="895350"/>
+          </a:xfrm>
+          <a:prstGeom prst="ellipse">
+            <a:avLst/>
+          </a:prstGeom>
+          <a:solidFill>
+            <a:schemeClr val="accent6"/>
+          </a:solidFill>
+          <a:ln>
+            <a:noFill/>
+          </a:ln>
+        </p:spPr>
+        <p:style>
+          <a:lnRef idx="0">
+            <a:scrgbClr r="0" g="0" b="0"/>
+          </a:lnRef>
+          <a:fillRef idx="0">
+            <a:scrgbClr r="0" g="0" b="0"/>
+          </a:fillRef>
+          <a:effectRef idx="0">
+            <a:scrgbClr r="0" g="0" b="0"/>
+          </a:effectRef>
+          <a:fontRef idx="minor">
+            <a:schemeClr val="lt1"/>
+          </a:fontRef>
+        </p:style>
+        <p:txBody>
+          <a:bodyPr rtlCol="0" anchor="ctr"/>
+          <a:lstStyle/>
+          <a:p>
+            <a:pPr algn="ctr"/>
+            <a:r>
+              <a:rPr lang="fr-FR" dirty="0"/>
+              <a:t>JOURNAL</a:t>
+            </a:r>
+          </a:p>
+        </p:txBody>
+      </p:sp>
+      <p:sp>
+        <p:nvSpPr>
+          <p:cNvPr id="8" name="Ellipse 7">
+            <a:extLst>
+              <a:ext uri="{FF2B5EF4-FFF2-40B4-BE49-F238E27FC236}">
+                <a16:creationId xmlns:a16="http://schemas.microsoft.com/office/drawing/2014/main" id="{32A0DC22-E64C-0EF5-1A04-06F81C806113}"/>
+              </a:ext>
+            </a:extLst>
+          </p:cNvPr>
+          <p:cNvSpPr/>
+          <p:nvPr/>
+        </p:nvSpPr>
+        <p:spPr>
+          <a:xfrm>
+            <a:off x="2660787" y="920919"/>
+            <a:ext cx="2000250" cy="895350"/>
+          </a:xfrm>
+          <a:prstGeom prst="ellipse">
+            <a:avLst/>
+          </a:prstGeom>
+          <a:solidFill>
+            <a:schemeClr val="accent6"/>
+          </a:solidFill>
+          <a:ln>
+            <a:noFill/>
+          </a:ln>
+        </p:spPr>
+        <p:style>
+          <a:lnRef idx="0">
+            <a:scrgbClr r="0" g="0" b="0"/>
+          </a:lnRef>
+          <a:fillRef idx="0">
+            <a:scrgbClr r="0" g="0" b="0"/>
+          </a:fillRef>
+          <a:effectRef idx="0">
+            <a:scrgbClr r="0" g="0" b="0"/>
+          </a:effectRef>
+          <a:fontRef idx="minor">
+            <a:schemeClr val="lt1"/>
+          </a:fontRef>
+        </p:style>
+        <p:txBody>
+          <a:bodyPr rtlCol="0" anchor="ctr"/>
+          <a:lstStyle/>
+          <a:p>
+            <a:pPr algn="ctr"/>
+            <a:r>
+              <a:rPr lang="fr-FR" dirty="0"/>
+              <a:t>PUBMED</a:t>
+            </a:r>
+          </a:p>
+        </p:txBody>
+      </p:sp>
+      <p:cxnSp>
+        <p:nvCxnSpPr>
+          <p:cNvPr id="10" name="Connecteur droit avec flèche 9">
+            <a:extLst>
+              <a:ext uri="{FF2B5EF4-FFF2-40B4-BE49-F238E27FC236}">
+                <a16:creationId xmlns:a16="http://schemas.microsoft.com/office/drawing/2014/main" id="{C4AAEED1-0134-651E-563D-F2A661469613}"/>
+              </a:ext>
+            </a:extLst>
+          </p:cNvPr>
+          <p:cNvCxnSpPr>
+            <a:cxnSpLocks/>
+            <a:stCxn id="5" idx="7"/>
+            <a:endCxn id="6" idx="3"/>
+          </p:cNvCxnSpPr>
+          <p:nvPr/>
+        </p:nvCxnSpPr>
+        <p:spPr>
+          <a:xfrm flipV="1">
+            <a:off x="6500029" y="1831029"/>
+            <a:ext cx="790601" cy="978703"/>
+          </a:xfrm>
+          <a:prstGeom prst="straightConnector1">
+            <a:avLst/>
+          </a:prstGeom>
+          <a:ln>
+            <a:tailEnd type="triangle"/>
+          </a:ln>
+        </p:spPr>
+        <p:style>
+          <a:lnRef idx="1">
+            <a:schemeClr val="accent6"/>
+          </a:lnRef>
+          <a:fillRef idx="0">
+            <a:schemeClr val="accent6"/>
+          </a:fillRef>
+          <a:effectRef idx="0">
+            <a:schemeClr val="accent6"/>
+          </a:effectRef>
+          <a:fontRef idx="minor">
+            <a:schemeClr val="tx1"/>
+          </a:fontRef>
+        </p:style>
+      </p:cxnSp>
+      <p:cxnSp>
+        <p:nvCxnSpPr>
+          <p:cNvPr id="13" name="Connecteur droit avec flèche 12">
+            <a:extLst>
+              <a:ext uri="{FF2B5EF4-FFF2-40B4-BE49-F238E27FC236}">
+                <a16:creationId xmlns:a16="http://schemas.microsoft.com/office/drawing/2014/main" id="{44A4CF48-B151-1267-1E07-FAC90BFE515B}"/>
+              </a:ext>
+            </a:extLst>
+          </p:cNvPr>
+          <p:cNvCxnSpPr>
+            <a:cxnSpLocks/>
+            <a:stCxn id="5" idx="1"/>
+            <a:endCxn id="8" idx="5"/>
+          </p:cNvCxnSpPr>
+          <p:nvPr/>
+        </p:nvCxnSpPr>
+        <p:spPr>
+          <a:xfrm flipH="1" flipV="1">
+            <a:off x="4368107" y="1685148"/>
+            <a:ext cx="771414" cy="1124584"/>
+          </a:xfrm>
+          <a:prstGeom prst="straightConnector1">
+            <a:avLst/>
+          </a:prstGeom>
+          <a:ln>
+            <a:tailEnd type="triangle"/>
+          </a:ln>
+        </p:spPr>
+        <p:style>
+          <a:lnRef idx="1">
+            <a:schemeClr val="accent6"/>
+          </a:lnRef>
+          <a:fillRef idx="0">
+            <a:schemeClr val="accent6"/>
+          </a:fillRef>
+          <a:effectRef idx="0">
+            <a:schemeClr val="accent6"/>
+          </a:effectRef>
+          <a:fontRef idx="minor">
+            <a:schemeClr val="tx1"/>
+          </a:fontRef>
+        </p:style>
+      </p:cxnSp>
+      <p:cxnSp>
+        <p:nvCxnSpPr>
+          <p:cNvPr id="15" name="Connecteur droit avec flèche 14">
+            <a:extLst>
+              <a:ext uri="{FF2B5EF4-FFF2-40B4-BE49-F238E27FC236}">
+                <a16:creationId xmlns:a16="http://schemas.microsoft.com/office/drawing/2014/main" id="{BBDE7C5B-FBC9-B023-ECA0-5DF207CE566A}"/>
+              </a:ext>
+            </a:extLst>
+          </p:cNvPr>
+          <p:cNvCxnSpPr>
+            <a:stCxn id="5" idx="4"/>
+            <a:endCxn id="7" idx="0"/>
+          </p:cNvCxnSpPr>
+          <p:nvPr/>
+        </p:nvCxnSpPr>
+        <p:spPr>
+          <a:xfrm>
+            <a:off x="5819775" y="3530601"/>
+            <a:ext cx="0" cy="1389711"/>
+          </a:xfrm>
+          <a:prstGeom prst="straightConnector1">
+            <a:avLst/>
+          </a:prstGeom>
+          <a:ln>
+            <a:tailEnd type="triangle"/>
+          </a:ln>
+        </p:spPr>
+        <p:style>
+          <a:lnRef idx="1">
+            <a:schemeClr val="accent6"/>
+          </a:lnRef>
+          <a:fillRef idx="0">
+            <a:schemeClr val="accent6"/>
+          </a:fillRef>
+          <a:effectRef idx="0">
+            <a:schemeClr val="accent6"/>
+          </a:effectRef>
+          <a:fontRef idx="minor">
+            <a:schemeClr val="tx1"/>
+          </a:fontRef>
+        </p:style>
+      </p:cxnSp>
+      <p:sp>
+        <p:nvSpPr>
+          <p:cNvPr id="24" name="ZoneTexte 23">
+            <a:extLst>
+              <a:ext uri="{FF2B5EF4-FFF2-40B4-BE49-F238E27FC236}">
+                <a16:creationId xmlns:a16="http://schemas.microsoft.com/office/drawing/2014/main" id="{E220EDFE-6A0C-24B8-9142-42BAF94F3FFC}"/>
+              </a:ext>
+            </a:extLst>
+          </p:cNvPr>
+          <p:cNvSpPr txBox="1"/>
+          <p:nvPr/>
+        </p:nvSpPr>
+        <p:spPr>
+          <a:xfrm>
+            <a:off x="5819775" y="3630492"/>
+            <a:ext cx="369332" cy="1158330"/>
+          </a:xfrm>
+          <a:prstGeom prst="rect">
+            <a:avLst/>
+          </a:prstGeom>
+          <a:noFill/>
+        </p:spPr>
+        <p:txBody>
+          <a:bodyPr vert="eaVert" wrap="none" rtlCol="0">
+            <a:spAutoFit/>
+          </a:bodyPr>
+          <a:lstStyle/>
+          <a:p>
+            <a:r>
+              <a:rPr lang="fr-FR" sz="1200" dirty="0"/>
+              <a:t>Date de mention</a:t>
+            </a:r>
+          </a:p>
+        </p:txBody>
+      </p:sp>
+      <p:sp>
+        <p:nvSpPr>
+          <p:cNvPr id="26" name="ZoneTexte 25">
+            <a:extLst>
+              <a:ext uri="{FF2B5EF4-FFF2-40B4-BE49-F238E27FC236}">
+                <a16:creationId xmlns:a16="http://schemas.microsoft.com/office/drawing/2014/main" id="{34B8BF41-11DE-B698-5DC2-640884FF6595}"/>
+              </a:ext>
+            </a:extLst>
+          </p:cNvPr>
+          <p:cNvSpPr txBox="1"/>
+          <p:nvPr/>
+        </p:nvSpPr>
+        <p:spPr>
+          <a:xfrm rot="19495702">
+            <a:off x="4476371" y="1781940"/>
+            <a:ext cx="369332" cy="1158330"/>
+          </a:xfrm>
+          <a:prstGeom prst="rect">
+            <a:avLst/>
+          </a:prstGeom>
+          <a:noFill/>
+        </p:spPr>
+        <p:txBody>
+          <a:bodyPr vert="eaVert" wrap="none" rtlCol="0">
+            <a:spAutoFit/>
+          </a:bodyPr>
+          <a:lstStyle/>
+          <a:p>
+            <a:r>
+              <a:rPr lang="fr-FR" sz="1200" dirty="0"/>
+              <a:t>Date de mention</a:t>
+            </a:r>
+          </a:p>
+        </p:txBody>
+      </p:sp>
+      <p:sp>
+        <p:nvSpPr>
+          <p:cNvPr id="27" name="ZoneTexte 26">
+            <a:extLst>
+              <a:ext uri="{FF2B5EF4-FFF2-40B4-BE49-F238E27FC236}">
+                <a16:creationId xmlns:a16="http://schemas.microsoft.com/office/drawing/2014/main" id="{626B883B-155F-3264-84F7-DDB28AABC52C}"/>
+              </a:ext>
+            </a:extLst>
+          </p:cNvPr>
+          <p:cNvSpPr txBox="1"/>
+          <p:nvPr/>
+        </p:nvSpPr>
+        <p:spPr>
+          <a:xfrm rot="13033252">
+            <a:off x="6851550" y="1827669"/>
+            <a:ext cx="369332" cy="1158330"/>
+          </a:xfrm>
+          <a:prstGeom prst="rect">
+            <a:avLst/>
+          </a:prstGeom>
+          <a:noFill/>
+        </p:spPr>
+        <p:txBody>
+          <a:bodyPr vert="eaVert" wrap="none" rtlCol="0">
+            <a:spAutoFit/>
+          </a:bodyPr>
+          <a:lstStyle/>
+          <a:p>
+            <a:r>
+              <a:rPr lang="fr-FR" sz="1200" dirty="0"/>
+              <a:t>Date de mention</a:t>
+            </a:r>
+          </a:p>
+        </p:txBody>
+      </p:sp>
+    </p:spTree>
+    <p:extLst>
+      <p:ext uri="{BB962C8B-B14F-4D97-AF65-F5344CB8AC3E}">
+        <p14:creationId xmlns:p14="http://schemas.microsoft.com/office/powerpoint/2010/main" val="2789051179"/>
+      </p:ext>
+    </p:extLst>
+  </p:cSld>
+  <p:clrMapOvr>
+    <a:masterClrMapping/>
+  </p:clrMapOvr>
+</p:sld>
+</file>
+
+<file path=ppt/slides/slide11.xml><?xml version="1.0" encoding="utf-8"?>
+<p:sld xmlns:a="http://schemas.openxmlformats.org/drawingml/2006/main" xmlns:r="http://schemas.openxmlformats.org/officeDocument/2006/relationships" xmlns:p="http://schemas.openxmlformats.org/presentationml/2006/main">
+  <p:cSld>
+    <p:spTree>
+      <p:nvGrpSpPr>
+        <p:cNvPr id="1" name=""/>
+        <p:cNvGrpSpPr/>
+        <p:nvPr/>
+      </p:nvGrpSpPr>
+      <p:grpSpPr>
+        <a:xfrm>
+          <a:off x="0" y="0"/>
+          <a:ext cx="0" cy="0"/>
+          <a:chOff x="0" y="0"/>
+          <a:chExt cx="0" cy="0"/>
+        </a:xfrm>
+      </p:grpSpPr>
+      <p:sp>
+        <p:nvSpPr>
           <p:cNvPr id="35" name="Titre vertical 34">
             <a:extLst>
               <a:ext uri="{FF2B5EF4-FFF2-40B4-BE49-F238E27FC236}">
@@ -5170,7 +5765,7 @@
           <a:p>
             <a:fld id="{B1028D0C-BA6E-42FF-99E3-BB7D9AEC48EF}" type="slidenum">
               <a:rPr lang="fr-FR" smtClean="0"/>
-              <a:t>10</a:t>
+              <a:t>11</a:t>
             </a:fld>
             <a:endParaRPr lang="fr-FR"/>
           </a:p>
@@ -5841,7 +6436,7 @@
           <a:p>
             <a:r>
               <a:rPr lang="fr-FR" dirty="0"/>
-              <a:t>Nous souhaitons construire un pipeline dédié à la production pour référencer les médicaments à partir des publications scientifiques. </a:t>
+              <a:t>Nous souhaitons construire un pipeline dédié au référencement des médicaments à partir des publications scientifiques. </a:t>
             </a:r>
           </a:p>
           <a:p>
@@ -5904,6 +6499,16 @@
             <a:r>
               <a:rPr lang="fr-FR" dirty="0"/>
               <a:t>une quinzaine de lignes par table de données.</a:t>
+            </a:r>
+          </a:p>
+          <a:p>
+            <a:pPr marL="457200" indent="-457200">
+              <a:buFont typeface="+mj-lt"/>
+              <a:buAutoNum type="arabicPeriod"/>
+            </a:pPr>
+            <a:r>
+              <a:rPr lang="fr-FR" dirty="0"/>
+              <a:t>Réalisation d’un projet dédié à créer un DAG.</a:t>
             </a:r>
           </a:p>
           <a:p>
@@ -6715,7 +7320,10 @@
               <a:rPr lang="fr-FR" sz="1400" dirty="0" err="1"/>
               <a:t>clinical_trials</a:t>
             </a:r>
-            <a:endParaRPr lang="fr-FR" sz="1400" dirty="0"/>
+            <a:r>
+              <a:rPr lang="fr-FR" sz="1400" dirty="0"/>
+              <a:t> (suivant l’ordre ci-dessus)</a:t>
+            </a:r>
           </a:p>
         </p:txBody>
       </p:sp>
@@ -7783,16 +8391,6 @@
             </a:pPr>
             <a:r>
               <a:rPr lang="fr-FR" dirty="0"/>
-              <a:t>Plus de flexibilité</a:t>
-            </a:r>
-          </a:p>
-          <a:p>
-            <a:pPr marL="457200" indent="-457200">
-              <a:buFont typeface="+mj-lt"/>
-              <a:buAutoNum type="arabicPeriod"/>
-            </a:pPr>
-            <a:r>
-              <a:rPr lang="fr-FR" dirty="0"/>
               <a:t>Relance indépendante des tâches lors des erreurs</a:t>
             </a:r>
           </a:p>
@@ -7981,6 +8579,153 @@
           </a:p>
         </p:txBody>
       </p:sp>
+      <mc:AlternateContent xmlns:mc="http://schemas.openxmlformats.org/markup-compatibility/2006">
+        <mc:Choice xmlns:pslz="http://schemas.microsoft.com/office/powerpoint/2016/slidezoom" Requires="pslz">
+          <p:graphicFrame>
+            <p:nvGraphicFramePr>
+              <p:cNvPr id="12" name="Zoom de diapositive 11">
+                <a:extLst>
+                  <a:ext uri="{FF2B5EF4-FFF2-40B4-BE49-F238E27FC236}">
+                    <a16:creationId xmlns:a16="http://schemas.microsoft.com/office/drawing/2014/main" id="{67B66634-98FA-7546-3A69-93C83793EC3B}"/>
+                  </a:ext>
+                </a:extLst>
+              </p:cNvPr>
+              <p:cNvGraphicFramePr>
+                <a:graphicFrameLocks noChangeAspect="1"/>
+              </p:cNvGraphicFramePr>
+              <p:nvPr>
+                <p:extLst>
+                  <p:ext uri="{D42A27DB-BD31-4B8C-83A1-F6EECF244321}">
+                    <p14:modId xmlns:p14="http://schemas.microsoft.com/office/powerpoint/2010/main" val="3954284748"/>
+                  </p:ext>
+                </p:extLst>
+              </p:nvPr>
+            </p:nvGraphicFramePr>
+            <p:xfrm>
+              <a:off x="7418062" y="4422871"/>
+              <a:ext cx="3002845" cy="1689100"/>
+            </p:xfrm>
+            <a:graphic>
+              <a:graphicData uri="http://schemas.microsoft.com/office/powerpoint/2016/slidezoom">
+                <pslz:sldZm>
+                  <pslz:sldZmObj sldId="271" cId="1895299212">
+                    <pslz:zmPr id="{06EDF6FA-7738-4A90-9943-D725AB7E77FD}" returnToParent="0" transitionDur="1000">
+                      <p166:blipFill xmlns:p166="http://schemas.microsoft.com/office/powerpoint/2016/6/main">
+                        <a:blip r:embed="rId2"/>
+                        <a:stretch>
+                          <a:fillRect/>
+                        </a:stretch>
+                      </p166:blipFill>
+                      <p166:spPr xmlns:p166="http://schemas.microsoft.com/office/powerpoint/2016/6/main">
+                        <a:xfrm>
+                          <a:off x="0" y="0"/>
+                          <a:ext cx="3002845" cy="1689100"/>
+                        </a:xfrm>
+                        <a:prstGeom prst="rect">
+                          <a:avLst/>
+                        </a:prstGeom>
+                        <a:solidFill>
+                          <a:srgbClr val="FFFFFF">
+                            <a:shade val="85000"/>
+                          </a:srgbClr>
+                        </a:solidFill>
+                        <a:ln w="88900" cap="sq">
+                          <a:solidFill>
+                            <a:srgbClr val="FFFFFF"/>
+                          </a:solidFill>
+                          <a:miter lim="800000"/>
+                        </a:ln>
+                        <a:effectLst>
+                          <a:outerShdw blurRad="55000" dist="18000" dir="5400000" algn="tl" rotWithShape="0">
+                            <a:srgbClr val="000000">
+                              <a:alpha val="40000"/>
+                            </a:srgbClr>
+                          </a:outerShdw>
+                        </a:effectLst>
+                        <a:scene3d>
+                          <a:camera prst="orthographicFront"/>
+                          <a:lightRig rig="twoPt" dir="t">
+                            <a:rot lat="0" lon="0" rev="7200000"/>
+                          </a:lightRig>
+                        </a:scene3d>
+                        <a:sp3d>
+                          <a:bevelT w="25400" h="19050"/>
+                          <a:contourClr>
+                            <a:srgbClr val="FFFFFF"/>
+                          </a:contourClr>
+                        </a:sp3d>
+                      </p166:spPr>
+                    </pslz:zmPr>
+                  </pslz:sldZmObj>
+                </pslz:sldZm>
+              </a:graphicData>
+            </a:graphic>
+          </p:graphicFrame>
+        </mc:Choice>
+        <mc:Fallback>
+          <p:pic>
+            <p:nvPicPr>
+              <p:cNvPr id="12" name="Zoom de diapositive 11">
+                <a:hlinkClick r:id="rId3" action="ppaction://hlinksldjump"/>
+                <a:extLst>
+                  <a:ext uri="{FF2B5EF4-FFF2-40B4-BE49-F238E27FC236}">
+                    <a16:creationId xmlns:a16="http://schemas.microsoft.com/office/drawing/2014/main" id="{67B66634-98FA-7546-3A69-93C83793EC3B}"/>
+                  </a:ext>
+                </a:extLst>
+              </p:cNvPr>
+              <p:cNvPicPr>
+                <a:picLocks noGrp="1" noRot="1" noChangeAspect="1" noMove="1" noResize="1" noEditPoints="1" noAdjustHandles="1" noChangeArrowheads="1" noChangeShapeType="1"/>
+              </p:cNvPicPr>
+              <p:nvPr/>
+            </p:nvPicPr>
+            <p:blipFill>
+              <a:blip r:embed="rId2"/>
+              <a:stretch>
+                <a:fillRect/>
+              </a:stretch>
+            </p:blipFill>
+            <p:spPr>
+              <a:xfrm>
+                <a:off x="7418062" y="4422871"/>
+                <a:ext cx="3002845" cy="1689100"/>
+              </a:xfrm>
+              <a:prstGeom prst="rect">
+                <a:avLst/>
+              </a:prstGeom>
+              <a:solidFill>
+                <a:srgbClr val="FFFFFF">
+                  <a:shade val="85000"/>
+                </a:srgbClr>
+              </a:solidFill>
+              <a:ln w="88900" cap="sq">
+                <a:solidFill>
+                  <a:srgbClr val="FFFFFF"/>
+                </a:solidFill>
+                <a:miter lim="800000"/>
+              </a:ln>
+              <a:effectLst>
+                <a:outerShdw blurRad="55000" dist="18000" dir="5400000" algn="tl" rotWithShape="0">
+                  <a:srgbClr val="000000">
+                    <a:alpha val="40000"/>
+                  </a:srgbClr>
+                </a:outerShdw>
+              </a:effectLst>
+              <a:scene3d>
+                <a:camera prst="orthographicFront"/>
+                <a:lightRig rig="twoPt" dir="t">
+                  <a:rot lat="0" lon="0" rev="7200000"/>
+                </a:lightRig>
+              </a:scene3d>
+              <a:sp3d>
+                <a:bevelT w="25400" h="19050"/>
+                <a:contourClr>
+                  <a:srgbClr val="FFFFFF"/>
+                </a:contourClr>
+              </a:sp3d>
+            </p:spPr>
+          </p:pic>
+        </mc:Fallback>
+      </mc:AlternateContent>
     </p:spTree>
     <p:extLst>
       <p:ext uri="{BB962C8B-B14F-4D97-AF65-F5344CB8AC3E}">
@@ -7995,6 +8740,780 @@
 </file>
 
 <file path=ppt/slides/slide8.xml><?xml version="1.0" encoding="utf-8"?>
+<p:sld xmlns:a="http://schemas.openxmlformats.org/drawingml/2006/main" xmlns:r="http://schemas.openxmlformats.org/officeDocument/2006/relationships" xmlns:p="http://schemas.openxmlformats.org/presentationml/2006/main">
+  <p:cSld>
+    <p:spTree>
+      <p:nvGrpSpPr>
+        <p:cNvPr id="1" name=""/>
+        <p:cNvGrpSpPr/>
+        <p:nvPr/>
+      </p:nvGrpSpPr>
+      <p:grpSpPr>
+        <a:xfrm>
+          <a:off x="0" y="0"/>
+          <a:ext cx="0" cy="0"/>
+          <a:chOff x="0" y="0"/>
+          <a:chExt cx="0" cy="0"/>
+        </a:xfrm>
+      </p:grpSpPr>
+      <p:sp>
+        <p:nvSpPr>
+          <p:cNvPr id="2" name="Titre 1">
+            <a:extLst>
+              <a:ext uri="{FF2B5EF4-FFF2-40B4-BE49-F238E27FC236}">
+                <a16:creationId xmlns:a16="http://schemas.microsoft.com/office/drawing/2014/main" id="{1F914DE7-4565-815F-6216-F9066096D881}"/>
+              </a:ext>
+            </a:extLst>
+          </p:cNvPr>
+          <p:cNvSpPr>
+            <a:spLocks noGrp="1"/>
+          </p:cNvSpPr>
+          <p:nvPr>
+            <p:ph type="title"/>
+          </p:nvPr>
+        </p:nvSpPr>
+        <p:spPr/>
+        <p:txBody>
+          <a:bodyPr/>
+          <a:lstStyle/>
+          <a:p>
+            <a:r>
+              <a:rPr lang="fr-FR" dirty="0"/>
+              <a:t>Schéma du pipeline DAG </a:t>
+            </a:r>
+          </a:p>
+        </p:txBody>
+      </p:sp>
+      <p:sp>
+        <p:nvSpPr>
+          <p:cNvPr id="3" name="Espace réservé de la date 2">
+            <a:extLst>
+              <a:ext uri="{FF2B5EF4-FFF2-40B4-BE49-F238E27FC236}">
+                <a16:creationId xmlns:a16="http://schemas.microsoft.com/office/drawing/2014/main" id="{6C96595D-310B-2949-E98C-6E17D2446153}"/>
+              </a:ext>
+            </a:extLst>
+          </p:cNvPr>
+          <p:cNvSpPr>
+            <a:spLocks noGrp="1"/>
+          </p:cNvSpPr>
+          <p:nvPr>
+            <p:ph type="dt" sz="half" idx="10"/>
+          </p:nvPr>
+        </p:nvSpPr>
+        <p:spPr/>
+        <p:txBody>
+          <a:bodyPr/>
+          <a:lstStyle/>
+          <a:p>
+            <a:r>
+              <a:rPr lang="fr-FR"/>
+              <a:t>12/05/2025</a:t>
+            </a:r>
+          </a:p>
+        </p:txBody>
+      </p:sp>
+      <p:sp>
+        <p:nvSpPr>
+          <p:cNvPr id="4" name="Espace réservé du pied de page 3">
+            <a:extLst>
+              <a:ext uri="{FF2B5EF4-FFF2-40B4-BE49-F238E27FC236}">
+                <a16:creationId xmlns:a16="http://schemas.microsoft.com/office/drawing/2014/main" id="{A324CD88-E2CF-A6CD-B319-2CC4FE121AE4}"/>
+              </a:ext>
+            </a:extLst>
+          </p:cNvPr>
+          <p:cNvSpPr>
+            <a:spLocks noGrp="1"/>
+          </p:cNvSpPr>
+          <p:nvPr>
+            <p:ph type="ftr" sz="quarter" idx="11"/>
+          </p:nvPr>
+        </p:nvSpPr>
+        <p:spPr/>
+        <p:txBody>
+          <a:bodyPr/>
+          <a:lstStyle/>
+          <a:p>
+            <a:r>
+              <a:rPr lang="fr-FR"/>
+              <a:t>Marilyne HU</a:t>
+            </a:r>
+            <a:endParaRPr lang="fr-FR" dirty="0"/>
+          </a:p>
+        </p:txBody>
+      </p:sp>
+      <p:sp>
+        <p:nvSpPr>
+          <p:cNvPr id="5" name="Espace réservé du numéro de diapositive 4">
+            <a:extLst>
+              <a:ext uri="{FF2B5EF4-FFF2-40B4-BE49-F238E27FC236}">
+                <a16:creationId xmlns:a16="http://schemas.microsoft.com/office/drawing/2014/main" id="{CBE67552-633B-A938-6134-55E5A7B40ADC}"/>
+              </a:ext>
+            </a:extLst>
+          </p:cNvPr>
+          <p:cNvSpPr>
+            <a:spLocks noGrp="1"/>
+          </p:cNvSpPr>
+          <p:nvPr>
+            <p:ph type="sldNum" sz="quarter" idx="12"/>
+          </p:nvPr>
+        </p:nvSpPr>
+        <p:spPr/>
+        <p:txBody>
+          <a:bodyPr/>
+          <a:lstStyle/>
+          <a:p>
+            <a:fld id="{B1028D0C-BA6E-42FF-99E3-BB7D9AEC48EF}" type="slidenum">
+              <a:rPr lang="fr-FR" smtClean="0"/>
+              <a:t>8</a:t>
+            </a:fld>
+            <a:endParaRPr lang="fr-FR"/>
+          </a:p>
+        </p:txBody>
+      </p:sp>
+      <p:sp>
+        <p:nvSpPr>
+          <p:cNvPr id="6" name="Organigramme : Procédé 5">
+            <a:extLst>
+              <a:ext uri="{FF2B5EF4-FFF2-40B4-BE49-F238E27FC236}">
+                <a16:creationId xmlns:a16="http://schemas.microsoft.com/office/drawing/2014/main" id="{D1985419-746C-F6A2-3BDD-4D0BEBED2F91}"/>
+              </a:ext>
+            </a:extLst>
+          </p:cNvPr>
+          <p:cNvSpPr/>
+          <p:nvPr/>
+        </p:nvSpPr>
+        <p:spPr>
+          <a:xfrm>
+            <a:off x="768682" y="3434900"/>
+            <a:ext cx="1988082" cy="713822"/>
+          </a:xfrm>
+          <a:prstGeom prst="flowChartProcess">
+            <a:avLst/>
+          </a:prstGeom>
+          <a:solidFill>
+            <a:schemeClr val="accent2"/>
+          </a:solidFill>
+          <a:ln>
+            <a:noFill/>
+          </a:ln>
+        </p:spPr>
+        <p:style>
+          <a:lnRef idx="0">
+            <a:scrgbClr r="0" g="0" b="0"/>
+          </a:lnRef>
+          <a:fillRef idx="0">
+            <a:scrgbClr r="0" g="0" b="0"/>
+          </a:fillRef>
+          <a:effectRef idx="0">
+            <a:scrgbClr r="0" g="0" b="0"/>
+          </a:effectRef>
+          <a:fontRef idx="minor">
+            <a:schemeClr val="lt1"/>
+          </a:fontRef>
+        </p:style>
+        <p:txBody>
+          <a:bodyPr rtlCol="0" anchor="ctr"/>
+          <a:lstStyle/>
+          <a:p>
+            <a:pPr algn="ctr"/>
+            <a:r>
+              <a:rPr lang="fr-FR" sz="1400" dirty="0"/>
+              <a:t>Chargement des données</a:t>
+            </a:r>
+          </a:p>
+        </p:txBody>
+      </p:sp>
+      <p:sp>
+        <p:nvSpPr>
+          <p:cNvPr id="9" name="Organigramme : Procédé 8">
+            <a:extLst>
+              <a:ext uri="{FF2B5EF4-FFF2-40B4-BE49-F238E27FC236}">
+                <a16:creationId xmlns:a16="http://schemas.microsoft.com/office/drawing/2014/main" id="{42CEAEA8-6534-2C6B-CC08-5870EC01A249}"/>
+              </a:ext>
+            </a:extLst>
+          </p:cNvPr>
+          <p:cNvSpPr/>
+          <p:nvPr/>
+        </p:nvSpPr>
+        <p:spPr>
+          <a:xfrm>
+            <a:off x="3929824" y="2062325"/>
+            <a:ext cx="1988082" cy="713822"/>
+          </a:xfrm>
+          <a:prstGeom prst="flowChartProcess">
+            <a:avLst/>
+          </a:prstGeom>
+          <a:solidFill>
+            <a:schemeClr val="accent2"/>
+          </a:solidFill>
+          <a:ln>
+            <a:noFill/>
+          </a:ln>
+        </p:spPr>
+        <p:style>
+          <a:lnRef idx="0">
+            <a:scrgbClr r="0" g="0" b="0"/>
+          </a:lnRef>
+          <a:fillRef idx="0">
+            <a:scrgbClr r="0" g="0" b="0"/>
+          </a:fillRef>
+          <a:effectRef idx="0">
+            <a:scrgbClr r="0" g="0" b="0"/>
+          </a:effectRef>
+          <a:fontRef idx="minor">
+            <a:schemeClr val="lt1"/>
+          </a:fontRef>
+        </p:style>
+        <p:txBody>
+          <a:bodyPr rtlCol="0" anchor="ctr"/>
+          <a:lstStyle/>
+          <a:p>
+            <a:pPr algn="ctr"/>
+            <a:r>
+              <a:rPr lang="fr-FR" sz="1400" dirty="0"/>
+              <a:t>Nettoyage des données </a:t>
+            </a:r>
+            <a:r>
+              <a:rPr lang="fr-FR" sz="1400" i="1" dirty="0" err="1"/>
+              <a:t>clinical_trials</a:t>
+            </a:r>
+            <a:r>
+              <a:rPr lang="fr-FR" sz="1400" i="1" dirty="0"/>
+              <a:t> </a:t>
+            </a:r>
+          </a:p>
+        </p:txBody>
+      </p:sp>
+      <p:sp>
+        <p:nvSpPr>
+          <p:cNvPr id="10" name="Organigramme : Procédé 9">
+            <a:extLst>
+              <a:ext uri="{FF2B5EF4-FFF2-40B4-BE49-F238E27FC236}">
+                <a16:creationId xmlns:a16="http://schemas.microsoft.com/office/drawing/2014/main" id="{CFAC9CCC-28C2-7A78-FA38-7047BE893423}"/>
+              </a:ext>
+            </a:extLst>
+          </p:cNvPr>
+          <p:cNvSpPr/>
+          <p:nvPr/>
+        </p:nvSpPr>
+        <p:spPr>
+          <a:xfrm>
+            <a:off x="3929824" y="3434900"/>
+            <a:ext cx="1988082" cy="713822"/>
+          </a:xfrm>
+          <a:prstGeom prst="flowChartProcess">
+            <a:avLst/>
+          </a:prstGeom>
+          <a:solidFill>
+            <a:schemeClr val="accent2"/>
+          </a:solidFill>
+          <a:ln>
+            <a:noFill/>
+          </a:ln>
+        </p:spPr>
+        <p:style>
+          <a:lnRef idx="0">
+            <a:scrgbClr r="0" g="0" b="0"/>
+          </a:lnRef>
+          <a:fillRef idx="0">
+            <a:scrgbClr r="0" g="0" b="0"/>
+          </a:fillRef>
+          <a:effectRef idx="0">
+            <a:scrgbClr r="0" g="0" b="0"/>
+          </a:effectRef>
+          <a:fontRef idx="minor">
+            <a:schemeClr val="lt1"/>
+          </a:fontRef>
+        </p:style>
+        <p:txBody>
+          <a:bodyPr rtlCol="0" anchor="ctr"/>
+          <a:lstStyle/>
+          <a:p>
+            <a:pPr algn="ctr"/>
+            <a:r>
+              <a:rPr lang="fr-FR" sz="1400" dirty="0"/>
+              <a:t>Nettoyage des données </a:t>
+            </a:r>
+            <a:r>
+              <a:rPr lang="fr-FR" sz="1400" i="1" dirty="0" err="1"/>
+              <a:t>pubmed</a:t>
+            </a:r>
+            <a:endParaRPr lang="fr-FR" sz="1400" i="1" dirty="0"/>
+          </a:p>
+        </p:txBody>
+      </p:sp>
+      <p:sp>
+        <p:nvSpPr>
+          <p:cNvPr id="11" name="Organigramme : Procédé 10">
+            <a:extLst>
+              <a:ext uri="{FF2B5EF4-FFF2-40B4-BE49-F238E27FC236}">
+                <a16:creationId xmlns:a16="http://schemas.microsoft.com/office/drawing/2014/main" id="{2C304090-6654-CA39-B526-874A830FE393}"/>
+              </a:ext>
+            </a:extLst>
+          </p:cNvPr>
+          <p:cNvSpPr/>
+          <p:nvPr/>
+        </p:nvSpPr>
+        <p:spPr>
+          <a:xfrm>
+            <a:off x="3929824" y="4849762"/>
+            <a:ext cx="1988082" cy="713822"/>
+          </a:xfrm>
+          <a:prstGeom prst="flowChartProcess">
+            <a:avLst/>
+          </a:prstGeom>
+          <a:solidFill>
+            <a:schemeClr val="accent2"/>
+          </a:solidFill>
+          <a:ln>
+            <a:noFill/>
+          </a:ln>
+        </p:spPr>
+        <p:style>
+          <a:lnRef idx="0">
+            <a:scrgbClr r="0" g="0" b="0"/>
+          </a:lnRef>
+          <a:fillRef idx="0">
+            <a:scrgbClr r="0" g="0" b="0"/>
+          </a:fillRef>
+          <a:effectRef idx="0">
+            <a:scrgbClr r="0" g="0" b="0"/>
+          </a:effectRef>
+          <a:fontRef idx="minor">
+            <a:schemeClr val="lt1"/>
+          </a:fontRef>
+        </p:style>
+        <p:txBody>
+          <a:bodyPr rtlCol="0" anchor="ctr"/>
+          <a:lstStyle/>
+          <a:p>
+            <a:pPr algn="ctr"/>
+            <a:r>
+              <a:rPr lang="fr-FR" sz="1400" dirty="0"/>
+              <a:t>Nettoyage des données </a:t>
+            </a:r>
+            <a:r>
+              <a:rPr lang="fr-FR" sz="1400" i="1" dirty="0" err="1"/>
+              <a:t>drugs</a:t>
+            </a:r>
+            <a:endParaRPr lang="fr-FR" sz="1400" i="1" dirty="0"/>
+          </a:p>
+        </p:txBody>
+      </p:sp>
+      <p:sp>
+        <p:nvSpPr>
+          <p:cNvPr id="12" name="Organigramme : Procédé 11">
+            <a:extLst>
+              <a:ext uri="{FF2B5EF4-FFF2-40B4-BE49-F238E27FC236}">
+                <a16:creationId xmlns:a16="http://schemas.microsoft.com/office/drawing/2014/main" id="{9262B66E-0D58-5EF6-7360-43FA71B1C91A}"/>
+              </a:ext>
+            </a:extLst>
+          </p:cNvPr>
+          <p:cNvSpPr/>
+          <p:nvPr/>
+        </p:nvSpPr>
+        <p:spPr>
+          <a:xfrm>
+            <a:off x="7090966" y="3434900"/>
+            <a:ext cx="1988082" cy="713822"/>
+          </a:xfrm>
+          <a:prstGeom prst="flowChartProcess">
+            <a:avLst/>
+          </a:prstGeom>
+          <a:solidFill>
+            <a:schemeClr val="accent2"/>
+          </a:solidFill>
+          <a:ln>
+            <a:noFill/>
+          </a:ln>
+        </p:spPr>
+        <p:style>
+          <a:lnRef idx="0">
+            <a:scrgbClr r="0" g="0" b="0"/>
+          </a:lnRef>
+          <a:fillRef idx="0">
+            <a:scrgbClr r="0" g="0" b="0"/>
+          </a:fillRef>
+          <a:effectRef idx="0">
+            <a:scrgbClr r="0" g="0" b="0"/>
+          </a:effectRef>
+          <a:fontRef idx="minor">
+            <a:schemeClr val="lt1"/>
+          </a:fontRef>
+        </p:style>
+        <p:txBody>
+          <a:bodyPr rtlCol="0" anchor="ctr"/>
+          <a:lstStyle/>
+          <a:p>
+            <a:pPr algn="ctr"/>
+            <a:r>
+              <a:rPr lang="fr-FR" sz="1400" dirty="0"/>
+              <a:t>Matching entre les médicaments – publications</a:t>
+            </a:r>
+          </a:p>
+        </p:txBody>
+      </p:sp>
+      <p:sp>
+        <p:nvSpPr>
+          <p:cNvPr id="13" name="Organigramme : Procédé 12">
+            <a:extLst>
+              <a:ext uri="{FF2B5EF4-FFF2-40B4-BE49-F238E27FC236}">
+                <a16:creationId xmlns:a16="http://schemas.microsoft.com/office/drawing/2014/main" id="{CD852DCE-73B1-B590-0FF4-E9C7EB30B3CD}"/>
+              </a:ext>
+            </a:extLst>
+          </p:cNvPr>
+          <p:cNvSpPr/>
+          <p:nvPr/>
+        </p:nvSpPr>
+        <p:spPr>
+          <a:xfrm>
+            <a:off x="9806068" y="3429000"/>
+            <a:ext cx="1988082" cy="713822"/>
+          </a:xfrm>
+          <a:prstGeom prst="flowChartProcess">
+            <a:avLst/>
+          </a:prstGeom>
+          <a:solidFill>
+            <a:schemeClr val="accent2"/>
+          </a:solidFill>
+          <a:ln>
+            <a:noFill/>
+          </a:ln>
+        </p:spPr>
+        <p:style>
+          <a:lnRef idx="0">
+            <a:scrgbClr r="0" g="0" b="0"/>
+          </a:lnRef>
+          <a:fillRef idx="0">
+            <a:scrgbClr r="0" g="0" b="0"/>
+          </a:fillRef>
+          <a:effectRef idx="0">
+            <a:scrgbClr r="0" g="0" b="0"/>
+          </a:effectRef>
+          <a:fontRef idx="minor">
+            <a:schemeClr val="lt1"/>
+          </a:fontRef>
+        </p:style>
+        <p:txBody>
+          <a:bodyPr rtlCol="0" anchor="ctr"/>
+          <a:lstStyle/>
+          <a:p>
+            <a:pPr algn="ctr"/>
+            <a:r>
+              <a:rPr lang="fr-FR" sz="1400" dirty="0"/>
+              <a:t>Construction du JSON</a:t>
+            </a:r>
+          </a:p>
+        </p:txBody>
+      </p:sp>
+      <p:cxnSp>
+        <p:nvCxnSpPr>
+          <p:cNvPr id="15" name="Connecteur droit avec flèche 14">
+            <a:extLst>
+              <a:ext uri="{FF2B5EF4-FFF2-40B4-BE49-F238E27FC236}">
+                <a16:creationId xmlns:a16="http://schemas.microsoft.com/office/drawing/2014/main" id="{901C5A10-DC48-E6F3-B485-77C28B77D838}"/>
+              </a:ext>
+            </a:extLst>
+          </p:cNvPr>
+          <p:cNvCxnSpPr>
+            <a:stCxn id="6" idx="3"/>
+            <a:endCxn id="10" idx="1"/>
+          </p:cNvCxnSpPr>
+          <p:nvPr/>
+        </p:nvCxnSpPr>
+        <p:spPr>
+          <a:xfrm>
+            <a:off x="2756764" y="3791811"/>
+            <a:ext cx="1173060" cy="0"/>
+          </a:xfrm>
+          <a:prstGeom prst="straightConnector1">
+            <a:avLst/>
+          </a:prstGeom>
+          <a:ln>
+            <a:tailEnd type="triangle"/>
+          </a:ln>
+        </p:spPr>
+        <p:style>
+          <a:lnRef idx="2">
+            <a:schemeClr val="dk1"/>
+          </a:lnRef>
+          <a:fillRef idx="0">
+            <a:schemeClr val="dk1"/>
+          </a:fillRef>
+          <a:effectRef idx="1">
+            <a:schemeClr val="dk1"/>
+          </a:effectRef>
+          <a:fontRef idx="minor">
+            <a:schemeClr val="tx1"/>
+          </a:fontRef>
+        </p:style>
+      </p:cxnSp>
+      <p:cxnSp>
+        <p:nvCxnSpPr>
+          <p:cNvPr id="19" name="Connecteur : en angle 18">
+            <a:extLst>
+              <a:ext uri="{FF2B5EF4-FFF2-40B4-BE49-F238E27FC236}">
+                <a16:creationId xmlns:a16="http://schemas.microsoft.com/office/drawing/2014/main" id="{6F12CD9C-2EFC-1C0E-DAF5-97D8339A930B}"/>
+              </a:ext>
+            </a:extLst>
+          </p:cNvPr>
+          <p:cNvCxnSpPr>
+            <a:stCxn id="6" idx="3"/>
+            <a:endCxn id="9" idx="1"/>
+          </p:cNvCxnSpPr>
+          <p:nvPr/>
+        </p:nvCxnSpPr>
+        <p:spPr>
+          <a:xfrm flipV="1">
+            <a:off x="2756764" y="2419236"/>
+            <a:ext cx="1173060" cy="1372575"/>
+          </a:xfrm>
+          <a:prstGeom prst="bentConnector3">
+            <a:avLst/>
+          </a:prstGeom>
+          <a:ln>
+            <a:tailEnd type="triangle"/>
+          </a:ln>
+        </p:spPr>
+        <p:style>
+          <a:lnRef idx="2">
+            <a:schemeClr val="dk1"/>
+          </a:lnRef>
+          <a:fillRef idx="0">
+            <a:schemeClr val="dk1"/>
+          </a:fillRef>
+          <a:effectRef idx="1">
+            <a:schemeClr val="dk1"/>
+          </a:effectRef>
+          <a:fontRef idx="minor">
+            <a:schemeClr val="tx1"/>
+          </a:fontRef>
+        </p:style>
+      </p:cxnSp>
+      <p:cxnSp>
+        <p:nvCxnSpPr>
+          <p:cNvPr id="21" name="Connecteur : en angle 20">
+            <a:extLst>
+              <a:ext uri="{FF2B5EF4-FFF2-40B4-BE49-F238E27FC236}">
+                <a16:creationId xmlns:a16="http://schemas.microsoft.com/office/drawing/2014/main" id="{A7311446-DA19-4DA5-1B6F-CD677FF2EAAD}"/>
+              </a:ext>
+            </a:extLst>
+          </p:cNvPr>
+          <p:cNvCxnSpPr>
+            <a:stCxn id="6" idx="3"/>
+            <a:endCxn id="11" idx="1"/>
+          </p:cNvCxnSpPr>
+          <p:nvPr/>
+        </p:nvCxnSpPr>
+        <p:spPr>
+          <a:xfrm>
+            <a:off x="2756764" y="3791811"/>
+            <a:ext cx="1173060" cy="1414862"/>
+          </a:xfrm>
+          <a:prstGeom prst="bentConnector3">
+            <a:avLst/>
+          </a:prstGeom>
+          <a:ln>
+            <a:tailEnd type="triangle"/>
+          </a:ln>
+        </p:spPr>
+        <p:style>
+          <a:lnRef idx="2">
+            <a:schemeClr val="dk1"/>
+          </a:lnRef>
+          <a:fillRef idx="0">
+            <a:schemeClr val="dk1"/>
+          </a:fillRef>
+          <a:effectRef idx="1">
+            <a:schemeClr val="dk1"/>
+          </a:effectRef>
+          <a:fontRef idx="minor">
+            <a:schemeClr val="tx1"/>
+          </a:fontRef>
+        </p:style>
+      </p:cxnSp>
+      <p:cxnSp>
+        <p:nvCxnSpPr>
+          <p:cNvPr id="23" name="Connecteur droit avec flèche 22">
+            <a:extLst>
+              <a:ext uri="{FF2B5EF4-FFF2-40B4-BE49-F238E27FC236}">
+                <a16:creationId xmlns:a16="http://schemas.microsoft.com/office/drawing/2014/main" id="{C6EF7AB5-E61D-9975-D202-DE98D7FCB43E}"/>
+              </a:ext>
+            </a:extLst>
+          </p:cNvPr>
+          <p:cNvCxnSpPr>
+            <a:stCxn id="10" idx="3"/>
+            <a:endCxn id="12" idx="1"/>
+          </p:cNvCxnSpPr>
+          <p:nvPr/>
+        </p:nvCxnSpPr>
+        <p:spPr>
+          <a:xfrm>
+            <a:off x="5917906" y="3791811"/>
+            <a:ext cx="1173060" cy="0"/>
+          </a:xfrm>
+          <a:prstGeom prst="straightConnector1">
+            <a:avLst/>
+          </a:prstGeom>
+          <a:ln>
+            <a:tailEnd type="triangle"/>
+          </a:ln>
+        </p:spPr>
+        <p:style>
+          <a:lnRef idx="2">
+            <a:schemeClr val="dk1"/>
+          </a:lnRef>
+          <a:fillRef idx="0">
+            <a:schemeClr val="dk1"/>
+          </a:fillRef>
+          <a:effectRef idx="1">
+            <a:schemeClr val="dk1"/>
+          </a:effectRef>
+          <a:fontRef idx="minor">
+            <a:schemeClr val="tx1"/>
+          </a:fontRef>
+        </p:style>
+      </p:cxnSp>
+      <p:cxnSp>
+        <p:nvCxnSpPr>
+          <p:cNvPr id="25" name="Connecteur droit avec flèche 24">
+            <a:extLst>
+              <a:ext uri="{FF2B5EF4-FFF2-40B4-BE49-F238E27FC236}">
+                <a16:creationId xmlns:a16="http://schemas.microsoft.com/office/drawing/2014/main" id="{FC2649D4-631E-22A9-1899-4D1E5885ED80}"/>
+              </a:ext>
+            </a:extLst>
+          </p:cNvPr>
+          <p:cNvCxnSpPr>
+            <a:stCxn id="12" idx="3"/>
+            <a:endCxn id="13" idx="1"/>
+          </p:cNvCxnSpPr>
+          <p:nvPr/>
+        </p:nvCxnSpPr>
+        <p:spPr>
+          <a:xfrm flipV="1">
+            <a:off x="9079048" y="3785911"/>
+            <a:ext cx="727020" cy="5900"/>
+          </a:xfrm>
+          <a:prstGeom prst="straightConnector1">
+            <a:avLst/>
+          </a:prstGeom>
+          <a:ln>
+            <a:tailEnd type="triangle"/>
+          </a:ln>
+        </p:spPr>
+        <p:style>
+          <a:lnRef idx="2">
+            <a:schemeClr val="dk1"/>
+          </a:lnRef>
+          <a:fillRef idx="0">
+            <a:schemeClr val="dk1"/>
+          </a:fillRef>
+          <a:effectRef idx="1">
+            <a:schemeClr val="dk1"/>
+          </a:effectRef>
+          <a:fontRef idx="minor">
+            <a:schemeClr val="tx1"/>
+          </a:fontRef>
+        </p:style>
+      </p:cxnSp>
+      <p:cxnSp>
+        <p:nvCxnSpPr>
+          <p:cNvPr id="27" name="Connecteur : en angle 26">
+            <a:extLst>
+              <a:ext uri="{FF2B5EF4-FFF2-40B4-BE49-F238E27FC236}">
+                <a16:creationId xmlns:a16="http://schemas.microsoft.com/office/drawing/2014/main" id="{513C2EB7-4FFF-1DE5-F0AF-A26229C4C36C}"/>
+              </a:ext>
+            </a:extLst>
+          </p:cNvPr>
+          <p:cNvCxnSpPr>
+            <a:stCxn id="9" idx="3"/>
+            <a:endCxn id="12" idx="1"/>
+          </p:cNvCxnSpPr>
+          <p:nvPr/>
+        </p:nvCxnSpPr>
+        <p:spPr>
+          <a:xfrm>
+            <a:off x="5917906" y="2419236"/>
+            <a:ext cx="1173060" cy="1372575"/>
+          </a:xfrm>
+          <a:prstGeom prst="bentConnector3">
+            <a:avLst/>
+          </a:prstGeom>
+          <a:ln>
+            <a:tailEnd type="triangle"/>
+          </a:ln>
+        </p:spPr>
+        <p:style>
+          <a:lnRef idx="2">
+            <a:schemeClr val="dk1"/>
+          </a:lnRef>
+          <a:fillRef idx="0">
+            <a:schemeClr val="dk1"/>
+          </a:fillRef>
+          <a:effectRef idx="1">
+            <a:schemeClr val="dk1"/>
+          </a:effectRef>
+          <a:fontRef idx="minor">
+            <a:schemeClr val="tx1"/>
+          </a:fontRef>
+        </p:style>
+      </p:cxnSp>
+      <p:cxnSp>
+        <p:nvCxnSpPr>
+          <p:cNvPr id="29" name="Connecteur : en angle 28">
+            <a:extLst>
+              <a:ext uri="{FF2B5EF4-FFF2-40B4-BE49-F238E27FC236}">
+                <a16:creationId xmlns:a16="http://schemas.microsoft.com/office/drawing/2014/main" id="{D275B395-8E6F-37B4-4C80-4F28A53D1912}"/>
+              </a:ext>
+            </a:extLst>
+          </p:cNvPr>
+          <p:cNvCxnSpPr>
+            <a:stCxn id="11" idx="3"/>
+            <a:endCxn id="12" idx="1"/>
+          </p:cNvCxnSpPr>
+          <p:nvPr/>
+        </p:nvCxnSpPr>
+        <p:spPr>
+          <a:xfrm flipV="1">
+            <a:off x="5917906" y="3791811"/>
+            <a:ext cx="1173060" cy="1414862"/>
+          </a:xfrm>
+          <a:prstGeom prst="bentConnector3">
+            <a:avLst/>
+          </a:prstGeom>
+          <a:ln>
+            <a:tailEnd type="triangle"/>
+          </a:ln>
+        </p:spPr>
+        <p:style>
+          <a:lnRef idx="2">
+            <a:schemeClr val="dk1"/>
+          </a:lnRef>
+          <a:fillRef idx="0">
+            <a:schemeClr val="dk1"/>
+          </a:fillRef>
+          <a:effectRef idx="1">
+            <a:schemeClr val="dk1"/>
+          </a:effectRef>
+          <a:fontRef idx="minor">
+            <a:schemeClr val="tx1"/>
+          </a:fontRef>
+        </p:style>
+      </p:cxnSp>
+    </p:spTree>
+    <p:extLst>
+      <p:ext uri="{BB962C8B-B14F-4D97-AF65-F5344CB8AC3E}">
+        <p14:creationId xmlns:p14="http://schemas.microsoft.com/office/powerpoint/2010/main" val="1895299212"/>
+      </p:ext>
+    </p:extLst>
+  </p:cSld>
+  <p:clrMapOvr>
+    <a:masterClrMapping/>
+  </p:clrMapOvr>
+</p:sld>
+</file>
+
+<file path=ppt/slides/slide9.xml><?xml version="1.0" encoding="utf-8"?>
 <p:sld xmlns:a="http://schemas.openxmlformats.org/drawingml/2006/main" xmlns:r="http://schemas.openxmlformats.org/officeDocument/2006/relationships" xmlns:p="http://schemas.openxmlformats.org/presentationml/2006/main">
   <p:cSld>
     <p:bg>
@@ -8127,7 +9646,7 @@
           <a:p>
             <a:fld id="{B1028D0C-BA6E-42FF-99E3-BB7D9AEC48EF}" type="slidenum">
               <a:rPr lang="fr-FR" smtClean="0"/>
-              <a:t>8</a:t>
+              <a:t>9</a:t>
             </a:fld>
             <a:endParaRPr lang="fr-FR" dirty="0"/>
           </a:p>
@@ -8174,600 +9693,6 @@
     <p:extLst>
       <p:ext uri="{BB962C8B-B14F-4D97-AF65-F5344CB8AC3E}">
         <p14:creationId xmlns:p14="http://schemas.microsoft.com/office/powerpoint/2010/main" val="426875986"/>
-      </p:ext>
-    </p:extLst>
-  </p:cSld>
-  <p:clrMapOvr>
-    <a:masterClrMapping/>
-  </p:clrMapOvr>
-</p:sld>
-</file>
-
-<file path=ppt/slides/slide9.xml><?xml version="1.0" encoding="utf-8"?>
-<p:sld xmlns:a="http://schemas.openxmlformats.org/drawingml/2006/main" xmlns:r="http://schemas.openxmlformats.org/officeDocument/2006/relationships" xmlns:p="http://schemas.openxmlformats.org/presentationml/2006/main">
-  <p:cSld>
-    <p:spTree>
-      <p:nvGrpSpPr>
-        <p:cNvPr id="1" name=""/>
-        <p:cNvGrpSpPr/>
-        <p:nvPr/>
-      </p:nvGrpSpPr>
-      <p:grpSpPr>
-        <a:xfrm>
-          <a:off x="0" y="0"/>
-          <a:ext cx="0" cy="0"/>
-          <a:chOff x="0" y="0"/>
-          <a:chExt cx="0" cy="0"/>
-        </a:xfrm>
-      </p:grpSpPr>
-      <p:sp>
-        <p:nvSpPr>
-          <p:cNvPr id="36" name="Titre vertical 35">
-            <a:extLst>
-              <a:ext uri="{FF2B5EF4-FFF2-40B4-BE49-F238E27FC236}">
-                <a16:creationId xmlns:a16="http://schemas.microsoft.com/office/drawing/2014/main" id="{DB9C129C-5D42-4387-8166-9397FB3D0439}"/>
-              </a:ext>
-            </a:extLst>
-          </p:cNvPr>
-          <p:cNvSpPr>
-            <a:spLocks noGrp="1"/>
-          </p:cNvSpPr>
-          <p:nvPr>
-            <p:ph type="title" orient="vert"/>
-          </p:nvPr>
-        </p:nvSpPr>
-        <p:spPr>
-          <a:xfrm>
-            <a:off x="10041774" y="412302"/>
-            <a:ext cx="1312026" cy="5759898"/>
-          </a:xfrm>
-        </p:spPr>
-        <p:txBody>
-          <a:bodyPr/>
-          <a:lstStyle/>
-          <a:p>
-            <a:r>
-              <a:rPr lang="fr-FR" dirty="0"/>
-              <a:t>ANNEXE 1</a:t>
-            </a:r>
-          </a:p>
-        </p:txBody>
-      </p:sp>
-      <p:sp>
-        <p:nvSpPr>
-          <p:cNvPr id="2" name="Espace réservé de la date 1">
-            <a:extLst>
-              <a:ext uri="{FF2B5EF4-FFF2-40B4-BE49-F238E27FC236}">
-                <a16:creationId xmlns:a16="http://schemas.microsoft.com/office/drawing/2014/main" id="{195D6EBD-3BEC-E192-1844-56E8405F4740}"/>
-              </a:ext>
-            </a:extLst>
-          </p:cNvPr>
-          <p:cNvSpPr>
-            <a:spLocks noGrp="1"/>
-          </p:cNvSpPr>
-          <p:nvPr>
-            <p:ph type="dt" sz="half" idx="10"/>
-          </p:nvPr>
-        </p:nvSpPr>
-        <p:spPr/>
-        <p:txBody>
-          <a:bodyPr/>
-          <a:lstStyle/>
-          <a:p>
-            <a:r>
-              <a:rPr lang="fr-FR"/>
-              <a:t>12/05/2025</a:t>
-            </a:r>
-          </a:p>
-        </p:txBody>
-      </p:sp>
-      <p:sp>
-        <p:nvSpPr>
-          <p:cNvPr id="3" name="Espace réservé du pied de page 2">
-            <a:extLst>
-              <a:ext uri="{FF2B5EF4-FFF2-40B4-BE49-F238E27FC236}">
-                <a16:creationId xmlns:a16="http://schemas.microsoft.com/office/drawing/2014/main" id="{72BC6ADB-4F82-16FB-4DF1-A11B690D46E7}"/>
-              </a:ext>
-            </a:extLst>
-          </p:cNvPr>
-          <p:cNvSpPr>
-            <a:spLocks noGrp="1"/>
-          </p:cNvSpPr>
-          <p:nvPr>
-            <p:ph type="ftr" sz="quarter" idx="11"/>
-          </p:nvPr>
-        </p:nvSpPr>
-        <p:spPr/>
-        <p:txBody>
-          <a:bodyPr/>
-          <a:lstStyle/>
-          <a:p>
-            <a:r>
-              <a:rPr lang="fr-FR"/>
-              <a:t>Marilyne HU</a:t>
-            </a:r>
-            <a:endParaRPr lang="fr-FR" dirty="0"/>
-          </a:p>
-        </p:txBody>
-      </p:sp>
-      <p:sp>
-        <p:nvSpPr>
-          <p:cNvPr id="4" name="Espace réservé du numéro de diapositive 3">
-            <a:extLst>
-              <a:ext uri="{FF2B5EF4-FFF2-40B4-BE49-F238E27FC236}">
-                <a16:creationId xmlns:a16="http://schemas.microsoft.com/office/drawing/2014/main" id="{854B1843-A954-F208-B5D1-A45B930AB947}"/>
-              </a:ext>
-            </a:extLst>
-          </p:cNvPr>
-          <p:cNvSpPr>
-            <a:spLocks noGrp="1"/>
-          </p:cNvSpPr>
-          <p:nvPr>
-            <p:ph type="sldNum" sz="quarter" idx="12"/>
-          </p:nvPr>
-        </p:nvSpPr>
-        <p:spPr/>
-        <p:txBody>
-          <a:bodyPr/>
-          <a:lstStyle/>
-          <a:p>
-            <a:fld id="{B1028D0C-BA6E-42FF-99E3-BB7D9AEC48EF}" type="slidenum">
-              <a:rPr lang="fr-FR" smtClean="0"/>
-              <a:t>9</a:t>
-            </a:fld>
-            <a:endParaRPr lang="fr-FR"/>
-          </a:p>
-        </p:txBody>
-      </p:sp>
-      <p:sp>
-        <p:nvSpPr>
-          <p:cNvPr id="5" name="Ellipse 4">
-            <a:extLst>
-              <a:ext uri="{FF2B5EF4-FFF2-40B4-BE49-F238E27FC236}">
-                <a16:creationId xmlns:a16="http://schemas.microsoft.com/office/drawing/2014/main" id="{D757DBB9-F421-FA42-C1E2-F75E92BF5060}"/>
-              </a:ext>
-            </a:extLst>
-          </p:cNvPr>
-          <p:cNvSpPr/>
-          <p:nvPr/>
-        </p:nvSpPr>
-        <p:spPr>
-          <a:xfrm>
-            <a:off x="4857750" y="2686051"/>
-            <a:ext cx="1924050" cy="844550"/>
-          </a:xfrm>
-          <a:prstGeom prst="ellipse">
-            <a:avLst/>
-          </a:prstGeom>
-          <a:solidFill>
-            <a:schemeClr val="accent6"/>
-          </a:solidFill>
-          <a:ln>
-            <a:noFill/>
-          </a:ln>
-        </p:spPr>
-        <p:style>
-          <a:lnRef idx="0">
-            <a:scrgbClr r="0" g="0" b="0"/>
-          </a:lnRef>
-          <a:fillRef idx="0">
-            <a:scrgbClr r="0" g="0" b="0"/>
-          </a:fillRef>
-          <a:effectRef idx="0">
-            <a:scrgbClr r="0" g="0" b="0"/>
-          </a:effectRef>
-          <a:fontRef idx="minor">
-            <a:schemeClr val="lt1"/>
-          </a:fontRef>
-        </p:style>
-        <p:txBody>
-          <a:bodyPr rtlCol="0" anchor="ctr"/>
-          <a:lstStyle/>
-          <a:p>
-            <a:pPr algn="ctr"/>
-            <a:r>
-              <a:rPr lang="fr-FR" dirty="0"/>
-              <a:t>DRUG</a:t>
-            </a:r>
-          </a:p>
-        </p:txBody>
-      </p:sp>
-      <p:sp>
-        <p:nvSpPr>
-          <p:cNvPr id="6" name="Ellipse 5">
-            <a:extLst>
-              <a:ext uri="{FF2B5EF4-FFF2-40B4-BE49-F238E27FC236}">
-                <a16:creationId xmlns:a16="http://schemas.microsoft.com/office/drawing/2014/main" id="{817DE848-2EEC-578B-CCC2-379836B438A9}"/>
-              </a:ext>
-            </a:extLst>
-          </p:cNvPr>
-          <p:cNvSpPr/>
-          <p:nvPr/>
-        </p:nvSpPr>
-        <p:spPr>
-          <a:xfrm>
-            <a:off x="6997700" y="1066800"/>
-            <a:ext cx="2000250" cy="895350"/>
-          </a:xfrm>
-          <a:prstGeom prst="ellipse">
-            <a:avLst/>
-          </a:prstGeom>
-          <a:solidFill>
-            <a:schemeClr val="accent6"/>
-          </a:solidFill>
-          <a:ln>
-            <a:noFill/>
-          </a:ln>
-        </p:spPr>
-        <p:style>
-          <a:lnRef idx="0">
-            <a:scrgbClr r="0" g="0" b="0"/>
-          </a:lnRef>
-          <a:fillRef idx="0">
-            <a:scrgbClr r="0" g="0" b="0"/>
-          </a:fillRef>
-          <a:effectRef idx="0">
-            <a:scrgbClr r="0" g="0" b="0"/>
-          </a:effectRef>
-          <a:fontRef idx="minor">
-            <a:schemeClr val="lt1"/>
-          </a:fontRef>
-        </p:style>
-        <p:txBody>
-          <a:bodyPr rtlCol="0" anchor="ctr"/>
-          <a:lstStyle/>
-          <a:p>
-            <a:pPr algn="ctr"/>
-            <a:r>
-              <a:rPr lang="fr-FR" dirty="0"/>
-              <a:t>CLINICAL TRIALS</a:t>
-            </a:r>
-          </a:p>
-        </p:txBody>
-      </p:sp>
-      <p:sp>
-        <p:nvSpPr>
-          <p:cNvPr id="7" name="Ellipse 6">
-            <a:extLst>
-              <a:ext uri="{FF2B5EF4-FFF2-40B4-BE49-F238E27FC236}">
-                <a16:creationId xmlns:a16="http://schemas.microsoft.com/office/drawing/2014/main" id="{F92502DB-7FF4-27F4-E38A-374B36CEFCE5}"/>
-              </a:ext>
-            </a:extLst>
-          </p:cNvPr>
-          <p:cNvSpPr/>
-          <p:nvPr/>
-        </p:nvSpPr>
-        <p:spPr>
-          <a:xfrm>
-            <a:off x="4819650" y="4920312"/>
-            <a:ext cx="2000250" cy="895350"/>
-          </a:xfrm>
-          <a:prstGeom prst="ellipse">
-            <a:avLst/>
-          </a:prstGeom>
-          <a:solidFill>
-            <a:schemeClr val="accent6"/>
-          </a:solidFill>
-          <a:ln>
-            <a:noFill/>
-          </a:ln>
-        </p:spPr>
-        <p:style>
-          <a:lnRef idx="0">
-            <a:scrgbClr r="0" g="0" b="0"/>
-          </a:lnRef>
-          <a:fillRef idx="0">
-            <a:scrgbClr r="0" g="0" b="0"/>
-          </a:fillRef>
-          <a:effectRef idx="0">
-            <a:scrgbClr r="0" g="0" b="0"/>
-          </a:effectRef>
-          <a:fontRef idx="minor">
-            <a:schemeClr val="lt1"/>
-          </a:fontRef>
-        </p:style>
-        <p:txBody>
-          <a:bodyPr rtlCol="0" anchor="ctr"/>
-          <a:lstStyle/>
-          <a:p>
-            <a:pPr algn="ctr"/>
-            <a:r>
-              <a:rPr lang="fr-FR" dirty="0"/>
-              <a:t>JOURNAL</a:t>
-            </a:r>
-          </a:p>
-        </p:txBody>
-      </p:sp>
-      <p:sp>
-        <p:nvSpPr>
-          <p:cNvPr id="8" name="Ellipse 7">
-            <a:extLst>
-              <a:ext uri="{FF2B5EF4-FFF2-40B4-BE49-F238E27FC236}">
-                <a16:creationId xmlns:a16="http://schemas.microsoft.com/office/drawing/2014/main" id="{32A0DC22-E64C-0EF5-1A04-06F81C806113}"/>
-              </a:ext>
-            </a:extLst>
-          </p:cNvPr>
-          <p:cNvSpPr/>
-          <p:nvPr/>
-        </p:nvSpPr>
-        <p:spPr>
-          <a:xfrm>
-            <a:off x="2660787" y="920919"/>
-            <a:ext cx="2000250" cy="895350"/>
-          </a:xfrm>
-          <a:prstGeom prst="ellipse">
-            <a:avLst/>
-          </a:prstGeom>
-          <a:solidFill>
-            <a:schemeClr val="accent6"/>
-          </a:solidFill>
-          <a:ln>
-            <a:noFill/>
-          </a:ln>
-        </p:spPr>
-        <p:style>
-          <a:lnRef idx="0">
-            <a:scrgbClr r="0" g="0" b="0"/>
-          </a:lnRef>
-          <a:fillRef idx="0">
-            <a:scrgbClr r="0" g="0" b="0"/>
-          </a:fillRef>
-          <a:effectRef idx="0">
-            <a:scrgbClr r="0" g="0" b="0"/>
-          </a:effectRef>
-          <a:fontRef idx="minor">
-            <a:schemeClr val="lt1"/>
-          </a:fontRef>
-        </p:style>
-        <p:txBody>
-          <a:bodyPr rtlCol="0" anchor="ctr"/>
-          <a:lstStyle/>
-          <a:p>
-            <a:pPr algn="ctr"/>
-            <a:r>
-              <a:rPr lang="fr-FR" dirty="0"/>
-              <a:t>PUBMED</a:t>
-            </a:r>
-          </a:p>
-        </p:txBody>
-      </p:sp>
-      <p:cxnSp>
-        <p:nvCxnSpPr>
-          <p:cNvPr id="10" name="Connecteur droit avec flèche 9">
-            <a:extLst>
-              <a:ext uri="{FF2B5EF4-FFF2-40B4-BE49-F238E27FC236}">
-                <a16:creationId xmlns:a16="http://schemas.microsoft.com/office/drawing/2014/main" id="{C4AAEED1-0134-651E-563D-F2A661469613}"/>
-              </a:ext>
-            </a:extLst>
-          </p:cNvPr>
-          <p:cNvCxnSpPr>
-            <a:cxnSpLocks/>
-            <a:stCxn id="5" idx="7"/>
-            <a:endCxn id="6" idx="3"/>
-          </p:cNvCxnSpPr>
-          <p:nvPr/>
-        </p:nvCxnSpPr>
-        <p:spPr>
-          <a:xfrm flipV="1">
-            <a:off x="6500029" y="1831029"/>
-            <a:ext cx="790601" cy="978703"/>
-          </a:xfrm>
-          <a:prstGeom prst="straightConnector1">
-            <a:avLst/>
-          </a:prstGeom>
-          <a:ln>
-            <a:tailEnd type="triangle"/>
-          </a:ln>
-        </p:spPr>
-        <p:style>
-          <a:lnRef idx="1">
-            <a:schemeClr val="accent6"/>
-          </a:lnRef>
-          <a:fillRef idx="0">
-            <a:schemeClr val="accent6"/>
-          </a:fillRef>
-          <a:effectRef idx="0">
-            <a:schemeClr val="accent6"/>
-          </a:effectRef>
-          <a:fontRef idx="minor">
-            <a:schemeClr val="tx1"/>
-          </a:fontRef>
-        </p:style>
-      </p:cxnSp>
-      <p:cxnSp>
-        <p:nvCxnSpPr>
-          <p:cNvPr id="13" name="Connecteur droit avec flèche 12">
-            <a:extLst>
-              <a:ext uri="{FF2B5EF4-FFF2-40B4-BE49-F238E27FC236}">
-                <a16:creationId xmlns:a16="http://schemas.microsoft.com/office/drawing/2014/main" id="{44A4CF48-B151-1267-1E07-FAC90BFE515B}"/>
-              </a:ext>
-            </a:extLst>
-          </p:cNvPr>
-          <p:cNvCxnSpPr>
-            <a:cxnSpLocks/>
-            <a:stCxn id="5" idx="1"/>
-            <a:endCxn id="8" idx="5"/>
-          </p:cNvCxnSpPr>
-          <p:nvPr/>
-        </p:nvCxnSpPr>
-        <p:spPr>
-          <a:xfrm flipH="1" flipV="1">
-            <a:off x="4368107" y="1685148"/>
-            <a:ext cx="771414" cy="1124584"/>
-          </a:xfrm>
-          <a:prstGeom prst="straightConnector1">
-            <a:avLst/>
-          </a:prstGeom>
-          <a:ln>
-            <a:tailEnd type="triangle"/>
-          </a:ln>
-        </p:spPr>
-        <p:style>
-          <a:lnRef idx="1">
-            <a:schemeClr val="accent6"/>
-          </a:lnRef>
-          <a:fillRef idx="0">
-            <a:schemeClr val="accent6"/>
-          </a:fillRef>
-          <a:effectRef idx="0">
-            <a:schemeClr val="accent6"/>
-          </a:effectRef>
-          <a:fontRef idx="minor">
-            <a:schemeClr val="tx1"/>
-          </a:fontRef>
-        </p:style>
-      </p:cxnSp>
-      <p:cxnSp>
-        <p:nvCxnSpPr>
-          <p:cNvPr id="15" name="Connecteur droit avec flèche 14">
-            <a:extLst>
-              <a:ext uri="{FF2B5EF4-FFF2-40B4-BE49-F238E27FC236}">
-                <a16:creationId xmlns:a16="http://schemas.microsoft.com/office/drawing/2014/main" id="{BBDE7C5B-FBC9-B023-ECA0-5DF207CE566A}"/>
-              </a:ext>
-            </a:extLst>
-          </p:cNvPr>
-          <p:cNvCxnSpPr>
-            <a:stCxn id="5" idx="4"/>
-            <a:endCxn id="7" idx="0"/>
-          </p:cNvCxnSpPr>
-          <p:nvPr/>
-        </p:nvCxnSpPr>
-        <p:spPr>
-          <a:xfrm>
-            <a:off x="5819775" y="3530601"/>
-            <a:ext cx="0" cy="1389711"/>
-          </a:xfrm>
-          <a:prstGeom prst="straightConnector1">
-            <a:avLst/>
-          </a:prstGeom>
-          <a:ln>
-            <a:tailEnd type="triangle"/>
-          </a:ln>
-        </p:spPr>
-        <p:style>
-          <a:lnRef idx="1">
-            <a:schemeClr val="accent6"/>
-          </a:lnRef>
-          <a:fillRef idx="0">
-            <a:schemeClr val="accent6"/>
-          </a:fillRef>
-          <a:effectRef idx="0">
-            <a:schemeClr val="accent6"/>
-          </a:effectRef>
-          <a:fontRef idx="minor">
-            <a:schemeClr val="tx1"/>
-          </a:fontRef>
-        </p:style>
-      </p:cxnSp>
-      <p:sp>
-        <p:nvSpPr>
-          <p:cNvPr id="24" name="ZoneTexte 23">
-            <a:extLst>
-              <a:ext uri="{FF2B5EF4-FFF2-40B4-BE49-F238E27FC236}">
-                <a16:creationId xmlns:a16="http://schemas.microsoft.com/office/drawing/2014/main" id="{E220EDFE-6A0C-24B8-9142-42BAF94F3FFC}"/>
-              </a:ext>
-            </a:extLst>
-          </p:cNvPr>
-          <p:cNvSpPr txBox="1"/>
-          <p:nvPr/>
-        </p:nvSpPr>
-        <p:spPr>
-          <a:xfrm>
-            <a:off x="5819775" y="3630492"/>
-            <a:ext cx="369332" cy="1158330"/>
-          </a:xfrm>
-          <a:prstGeom prst="rect">
-            <a:avLst/>
-          </a:prstGeom>
-          <a:noFill/>
-        </p:spPr>
-        <p:txBody>
-          <a:bodyPr vert="eaVert" wrap="none" rtlCol="0">
-            <a:spAutoFit/>
-          </a:bodyPr>
-          <a:lstStyle/>
-          <a:p>
-            <a:r>
-              <a:rPr lang="fr-FR" sz="1200" dirty="0"/>
-              <a:t>Date de mention</a:t>
-            </a:r>
-          </a:p>
-        </p:txBody>
-      </p:sp>
-      <p:sp>
-        <p:nvSpPr>
-          <p:cNvPr id="26" name="ZoneTexte 25">
-            <a:extLst>
-              <a:ext uri="{FF2B5EF4-FFF2-40B4-BE49-F238E27FC236}">
-                <a16:creationId xmlns:a16="http://schemas.microsoft.com/office/drawing/2014/main" id="{34B8BF41-11DE-B698-5DC2-640884FF6595}"/>
-              </a:ext>
-            </a:extLst>
-          </p:cNvPr>
-          <p:cNvSpPr txBox="1"/>
-          <p:nvPr/>
-        </p:nvSpPr>
-        <p:spPr>
-          <a:xfrm rot="19495702">
-            <a:off x="4476371" y="1781940"/>
-            <a:ext cx="369332" cy="1158330"/>
-          </a:xfrm>
-          <a:prstGeom prst="rect">
-            <a:avLst/>
-          </a:prstGeom>
-          <a:noFill/>
-        </p:spPr>
-        <p:txBody>
-          <a:bodyPr vert="eaVert" wrap="none" rtlCol="0">
-            <a:spAutoFit/>
-          </a:bodyPr>
-          <a:lstStyle/>
-          <a:p>
-            <a:r>
-              <a:rPr lang="fr-FR" sz="1200" dirty="0"/>
-              <a:t>Date de mention</a:t>
-            </a:r>
-          </a:p>
-        </p:txBody>
-      </p:sp>
-      <p:sp>
-        <p:nvSpPr>
-          <p:cNvPr id="27" name="ZoneTexte 26">
-            <a:extLst>
-              <a:ext uri="{FF2B5EF4-FFF2-40B4-BE49-F238E27FC236}">
-                <a16:creationId xmlns:a16="http://schemas.microsoft.com/office/drawing/2014/main" id="{626B883B-155F-3264-84F7-DDB28AABC52C}"/>
-              </a:ext>
-            </a:extLst>
-          </p:cNvPr>
-          <p:cNvSpPr txBox="1"/>
-          <p:nvPr/>
-        </p:nvSpPr>
-        <p:spPr>
-          <a:xfrm rot="13033252">
-            <a:off x="6851550" y="1827669"/>
-            <a:ext cx="369332" cy="1158330"/>
-          </a:xfrm>
-          <a:prstGeom prst="rect">
-            <a:avLst/>
-          </a:prstGeom>
-          <a:noFill/>
-        </p:spPr>
-        <p:txBody>
-          <a:bodyPr vert="eaVert" wrap="none" rtlCol="0">
-            <a:spAutoFit/>
-          </a:bodyPr>
-          <a:lstStyle/>
-          <a:p>
-            <a:r>
-              <a:rPr lang="fr-FR" sz="1200" dirty="0"/>
-              <a:t>Date de mention</a:t>
-            </a:r>
-          </a:p>
-        </p:txBody>
-      </p:sp>
-    </p:spTree>
-    <p:extLst>
-      <p:ext uri="{BB962C8B-B14F-4D97-AF65-F5344CB8AC3E}">
-        <p14:creationId xmlns:p14="http://schemas.microsoft.com/office/powerpoint/2010/main" val="2789051179"/>
       </p:ext>
     </p:extLst>
   </p:cSld>

</xml_diff>